<commit_message>
Add edits to manuscript
Add new manuscript edits from Jonathan and Nathan
Add start of Rmd ESA presentation
Add changes to the code/retry three species script
</commit_message>
<xml_diff>
--- a/manuscript/fig_1.pptx
+++ b/manuscript/fig_1.pptx
@@ -104,6 +104,11 @@
       </a:defRPr>
     </a:lvl9pPr>
   </p:defaultTextStyle>
+  <p:extLst>
+    <p:ext uri="{EFAFB233-063F-42B5-8137-9DF3F51BA10A}">
+      <p15:sldGuideLst xmlns:p15="http://schemas.microsoft.com/office/powerpoint/2012/main"/>
+    </p:ext>
+  </p:extLst>
 </p:presentation>
 </file>
 
@@ -238,7 +243,7 @@
           <a:p>
             <a:fld id="{0A766804-1A8B-0441-BDA6-29280BDB4D43}" type="datetimeFigureOut">
               <a:rPr lang="en-US" smtClean="0"/>
-              <a:t>5/10/18</a:t>
+              <a:t>5/16/18</a:t>
             </a:fld>
             <a:endParaRPr lang="en-US"/>
           </a:p>
@@ -408,7 +413,7 @@
           <a:p>
             <a:fld id="{0A766804-1A8B-0441-BDA6-29280BDB4D43}" type="datetimeFigureOut">
               <a:rPr lang="en-US" smtClean="0"/>
-              <a:t>5/10/18</a:t>
+              <a:t>5/16/18</a:t>
             </a:fld>
             <a:endParaRPr lang="en-US"/>
           </a:p>
@@ -588,7 +593,7 @@
           <a:p>
             <a:fld id="{0A766804-1A8B-0441-BDA6-29280BDB4D43}" type="datetimeFigureOut">
               <a:rPr lang="en-US" smtClean="0"/>
-              <a:t>5/10/18</a:t>
+              <a:t>5/16/18</a:t>
             </a:fld>
             <a:endParaRPr lang="en-US"/>
           </a:p>
@@ -758,7 +763,7 @@
           <a:p>
             <a:fld id="{0A766804-1A8B-0441-BDA6-29280BDB4D43}" type="datetimeFigureOut">
               <a:rPr lang="en-US" smtClean="0"/>
-              <a:t>5/10/18</a:t>
+              <a:t>5/16/18</a:t>
             </a:fld>
             <a:endParaRPr lang="en-US"/>
           </a:p>
@@ -1002,7 +1007,7 @@
           <a:p>
             <a:fld id="{0A766804-1A8B-0441-BDA6-29280BDB4D43}" type="datetimeFigureOut">
               <a:rPr lang="en-US" smtClean="0"/>
-              <a:t>5/10/18</a:t>
+              <a:t>5/16/18</a:t>
             </a:fld>
             <a:endParaRPr lang="en-US"/>
           </a:p>
@@ -1234,7 +1239,7 @@
           <a:p>
             <a:fld id="{0A766804-1A8B-0441-BDA6-29280BDB4D43}" type="datetimeFigureOut">
               <a:rPr lang="en-US" smtClean="0"/>
-              <a:t>5/10/18</a:t>
+              <a:t>5/16/18</a:t>
             </a:fld>
             <a:endParaRPr lang="en-US"/>
           </a:p>
@@ -1601,7 +1606,7 @@
           <a:p>
             <a:fld id="{0A766804-1A8B-0441-BDA6-29280BDB4D43}" type="datetimeFigureOut">
               <a:rPr lang="en-US" smtClean="0"/>
-              <a:t>5/10/18</a:t>
+              <a:t>5/16/18</a:t>
             </a:fld>
             <a:endParaRPr lang="en-US"/>
           </a:p>
@@ -1719,7 +1724,7 @@
           <a:p>
             <a:fld id="{0A766804-1A8B-0441-BDA6-29280BDB4D43}" type="datetimeFigureOut">
               <a:rPr lang="en-US" smtClean="0"/>
-              <a:t>5/10/18</a:t>
+              <a:t>5/16/18</a:t>
             </a:fld>
             <a:endParaRPr lang="en-US"/>
           </a:p>
@@ -1814,7 +1819,7 @@
           <a:p>
             <a:fld id="{0A766804-1A8B-0441-BDA6-29280BDB4D43}" type="datetimeFigureOut">
               <a:rPr lang="en-US" smtClean="0"/>
-              <a:t>5/10/18</a:t>
+              <a:t>5/16/18</a:t>
             </a:fld>
             <a:endParaRPr lang="en-US"/>
           </a:p>
@@ -2091,7 +2096,7 @@
           <a:p>
             <a:fld id="{0A766804-1A8B-0441-BDA6-29280BDB4D43}" type="datetimeFigureOut">
               <a:rPr lang="en-US" smtClean="0"/>
-              <a:t>5/10/18</a:t>
+              <a:t>5/16/18</a:t>
             </a:fld>
             <a:endParaRPr lang="en-US"/>
           </a:p>
@@ -2348,7 +2353,7 @@
           <a:p>
             <a:fld id="{0A766804-1A8B-0441-BDA6-29280BDB4D43}" type="datetimeFigureOut">
               <a:rPr lang="en-US" smtClean="0"/>
-              <a:t>5/10/18</a:t>
+              <a:t>5/16/18</a:t>
             </a:fld>
             <a:endParaRPr lang="en-US"/>
           </a:p>
@@ -2561,7 +2566,7 @@
           <a:p>
             <a:fld id="{0A766804-1A8B-0441-BDA6-29280BDB4D43}" type="datetimeFigureOut">
               <a:rPr lang="en-US" smtClean="0"/>
-              <a:t>5/10/18</a:t>
+              <a:t>5/16/18</a:t>
             </a:fld>
             <a:endParaRPr lang="en-US"/>
           </a:p>
@@ -2968,10 +2973,10 @@
       </p:grpSpPr>
       <p:grpSp>
         <p:nvGrpSpPr>
-          <p:cNvPr id="61" name="Group 60">
+          <p:cNvPr id="2" name="Group 1">
             <a:extLst>
               <a:ext uri="{FF2B5EF4-FFF2-40B4-BE49-F238E27FC236}">
-                <a16:creationId xmlns:a16="http://schemas.microsoft.com/office/drawing/2014/main" id="{34D3F8FC-E519-1848-A1C9-50C45061E529}"/>
+                <a16:creationId xmlns:a16="http://schemas.microsoft.com/office/drawing/2014/main" id="{04BC9BD2-C828-C04A-9021-F579B8B1552A}"/>
               </a:ext>
             </a:extLst>
           </p:cNvPr>
@@ -2980,487 +2985,129 @@
         </p:nvGrpSpPr>
         <p:grpSpPr>
           <a:xfrm>
-            <a:off x="888323" y="1198743"/>
-            <a:ext cx="1467694" cy="1753684"/>
-            <a:chOff x="941488" y="1198743"/>
-            <a:chExt cx="1467694" cy="1753684"/>
+            <a:off x="603457" y="211365"/>
+            <a:ext cx="4291545" cy="4017249"/>
+            <a:chOff x="378867" y="179281"/>
+            <a:chExt cx="4291545" cy="4017249"/>
           </a:xfrm>
         </p:grpSpPr>
-        <p:cxnSp>
-          <p:nvCxnSpPr>
-            <p:cNvPr id="22" name="Straight Arrow Connector 21">
+        <p:grpSp>
+          <p:nvGrpSpPr>
+            <p:cNvPr id="61" name="Group 60">
               <a:extLst>
                 <a:ext uri="{FF2B5EF4-FFF2-40B4-BE49-F238E27FC236}">
-                  <a16:creationId xmlns:a16="http://schemas.microsoft.com/office/drawing/2014/main" id="{3D737B9A-BD30-8A4B-A8C1-D9B251305394}"/>
+                  <a16:creationId xmlns:a16="http://schemas.microsoft.com/office/drawing/2014/main" id="{34D3F8FC-E519-1848-A1C9-50C45061E529}"/>
                 </a:ext>
               </a:extLst>
             </p:cNvPr>
-            <p:cNvCxnSpPr>
-              <a:cxnSpLocks/>
-            </p:cNvCxnSpPr>
+            <p:cNvGrpSpPr/>
             <p:nvPr/>
-          </p:nvCxnSpPr>
-          <p:spPr>
-            <a:xfrm rot="21382894" flipH="1">
-              <a:off x="1087588" y="1413667"/>
-              <a:ext cx="1321594" cy="1538760"/>
+          </p:nvGrpSpPr>
+          <p:grpSpPr>
+            <a:xfrm>
+              <a:off x="862381" y="1193443"/>
+              <a:ext cx="1546846" cy="1633621"/>
+              <a:chOff x="915546" y="1193443"/>
+              <a:chExt cx="1546846" cy="1633621"/>
             </a:xfrm>
-            <a:prstGeom prst="straightConnector1">
-              <a:avLst/>
-            </a:prstGeom>
-            <a:ln w="53975">
-              <a:solidFill>
+          </p:grpSpPr>
+          <p:cxnSp>
+            <p:nvCxnSpPr>
+              <p:cNvPr id="22" name="Straight Arrow Connector 21">
+                <a:extLst>
+                  <a:ext uri="{FF2B5EF4-FFF2-40B4-BE49-F238E27FC236}">
+                    <a16:creationId xmlns:a16="http://schemas.microsoft.com/office/drawing/2014/main" id="{3D737B9A-BD30-8A4B-A8C1-D9B251305394}"/>
+                  </a:ext>
+                </a:extLst>
+              </p:cNvPr>
+              <p:cNvCxnSpPr>
+                <a:cxnSpLocks/>
+              </p:cNvCxnSpPr>
+              <p:nvPr/>
+            </p:nvCxnSpPr>
+            <p:spPr>
+              <a:xfrm rot="21382894" flipH="1">
+                <a:off x="915546" y="1193443"/>
+                <a:ext cx="1321594" cy="1538760"/>
+              </a:xfrm>
+              <a:prstGeom prst="straightConnector1">
+                <a:avLst/>
+              </a:prstGeom>
+              <a:ln w="53975">
+                <a:solidFill>
+                  <a:schemeClr val="accent1"/>
+                </a:solidFill>
+                <a:headEnd type="none"/>
+                <a:tailEnd type="triangle"/>
+              </a:ln>
+            </p:spPr>
+            <p:style>
+              <a:lnRef idx="1">
                 <a:schemeClr val="accent1"/>
-              </a:solidFill>
-              <a:headEnd type="none"/>
-              <a:tailEnd type="triangle"/>
-            </a:ln>
-          </p:spPr>
-          <p:style>
-            <a:lnRef idx="1">
-              <a:schemeClr val="accent1"/>
-            </a:lnRef>
-            <a:fillRef idx="0">
-              <a:schemeClr val="accent1"/>
-            </a:fillRef>
-            <a:effectRef idx="0">
-              <a:schemeClr val="accent1"/>
-            </a:effectRef>
-            <a:fontRef idx="minor">
-              <a:schemeClr val="tx1"/>
-            </a:fontRef>
-          </p:style>
-        </p:cxnSp>
-        <p:cxnSp>
-          <p:nvCxnSpPr>
-            <p:cNvPr id="25" name="Straight Arrow Connector 24">
+              </a:lnRef>
+              <a:fillRef idx="0">
+                <a:schemeClr val="accent1"/>
+              </a:fillRef>
+              <a:effectRef idx="0">
+                <a:schemeClr val="accent1"/>
+              </a:effectRef>
+              <a:fontRef idx="minor">
+                <a:schemeClr val="tx1"/>
+              </a:fontRef>
+            </p:style>
+          </p:cxnSp>
+          <p:cxnSp>
+            <p:nvCxnSpPr>
+              <p:cNvPr id="25" name="Straight Arrow Connector 24">
+                <a:extLst>
+                  <a:ext uri="{FF2B5EF4-FFF2-40B4-BE49-F238E27FC236}">
+                    <a16:creationId xmlns:a16="http://schemas.microsoft.com/office/drawing/2014/main" id="{F261C5F6-A488-2F41-A287-2B6A304E7910}"/>
+                  </a:ext>
+                </a:extLst>
+              </p:cNvPr>
+              <p:cNvCxnSpPr>
+                <a:cxnSpLocks/>
+              </p:cNvCxnSpPr>
+              <p:nvPr/>
+            </p:nvCxnSpPr>
+            <p:spPr>
+              <a:xfrm rot="21382894" flipH="1">
+                <a:off x="1140798" y="1288304"/>
+                <a:ext cx="1321594" cy="1538760"/>
+              </a:xfrm>
+              <a:prstGeom prst="straightConnector1">
+                <a:avLst/>
+              </a:prstGeom>
+              <a:ln w="53975">
+                <a:solidFill>
+                  <a:schemeClr val="accent1"/>
+                </a:solidFill>
+                <a:headEnd type="triangle"/>
+                <a:tailEnd type="none"/>
+              </a:ln>
+            </p:spPr>
+            <p:style>
+              <a:lnRef idx="1">
+                <a:schemeClr val="accent1"/>
+              </a:lnRef>
+              <a:fillRef idx="0">
+                <a:schemeClr val="accent1"/>
+              </a:fillRef>
+              <a:effectRef idx="0">
+                <a:schemeClr val="accent1"/>
+              </a:effectRef>
+              <a:fontRef idx="minor">
+                <a:schemeClr val="tx1"/>
+              </a:fontRef>
+            </p:style>
+          </p:cxnSp>
+        </p:grpSp>
+        <p:sp>
+          <p:nvSpPr>
+            <p:cNvPr id="34" name="Circular Arrow 33">
               <a:extLst>
                 <a:ext uri="{FF2B5EF4-FFF2-40B4-BE49-F238E27FC236}">
-                  <a16:creationId xmlns:a16="http://schemas.microsoft.com/office/drawing/2014/main" id="{F261C5F6-A488-2F41-A287-2B6A304E7910}"/>
-                </a:ext>
-              </a:extLst>
-            </p:cNvPr>
-            <p:cNvCxnSpPr>
-              <a:cxnSpLocks/>
-            </p:cNvCxnSpPr>
-            <p:nvPr/>
-          </p:nvCxnSpPr>
-          <p:spPr>
-            <a:xfrm rot="21382894" flipH="1">
-              <a:off x="941488" y="1198743"/>
-              <a:ext cx="1321594" cy="1538760"/>
-            </a:xfrm>
-            <a:prstGeom prst="straightConnector1">
-              <a:avLst/>
-            </a:prstGeom>
-            <a:ln w="53975">
-              <a:solidFill>
-                <a:schemeClr val="accent1"/>
-              </a:solidFill>
-              <a:headEnd type="triangle"/>
-              <a:tailEnd type="none"/>
-            </a:ln>
-          </p:spPr>
-          <p:style>
-            <a:lnRef idx="1">
-              <a:schemeClr val="accent1"/>
-            </a:lnRef>
-            <a:fillRef idx="0">
-              <a:schemeClr val="accent1"/>
-            </a:fillRef>
-            <a:effectRef idx="0">
-              <a:schemeClr val="accent1"/>
-            </a:effectRef>
-            <a:fontRef idx="minor">
-              <a:schemeClr val="tx1"/>
-            </a:fontRef>
-          </p:style>
-        </p:cxnSp>
-      </p:grpSp>
-      <p:sp>
-        <p:nvSpPr>
-          <p:cNvPr id="34" name="Circular Arrow 33">
-            <a:extLst>
-              <a:ext uri="{FF2B5EF4-FFF2-40B4-BE49-F238E27FC236}">
-                <a16:creationId xmlns:a16="http://schemas.microsoft.com/office/drawing/2014/main" id="{ACE409BC-F04B-F24E-BEEB-618C164D418C}"/>
-              </a:ext>
-            </a:extLst>
-          </p:cNvPr>
-          <p:cNvSpPr/>
-          <p:nvPr/>
-        </p:nvSpPr>
-        <p:spPr>
-          <a:xfrm rot="10800000">
-            <a:off x="3767804" y="3142950"/>
-            <a:ext cx="902608" cy="932949"/>
-          </a:xfrm>
-          <a:prstGeom prst="circularArrow">
-            <a:avLst>
-              <a:gd name="adj1" fmla="val 4152"/>
-              <a:gd name="adj2" fmla="val 1142319"/>
-              <a:gd name="adj3" fmla="val 20436756"/>
-              <a:gd name="adj4" fmla="val 4971489"/>
-              <a:gd name="adj5" fmla="val 7562"/>
-            </a:avLst>
-          </a:prstGeom>
-          <a:ln>
-            <a:solidFill>
-              <a:schemeClr val="accent1"/>
-            </a:solidFill>
-          </a:ln>
-        </p:spPr>
-        <p:style>
-          <a:lnRef idx="2">
-            <a:schemeClr val="accent1">
-              <a:shade val="50000"/>
-            </a:schemeClr>
-          </a:lnRef>
-          <a:fillRef idx="1">
-            <a:schemeClr val="accent1"/>
-          </a:fillRef>
-          <a:effectRef idx="0">
-            <a:schemeClr val="accent1"/>
-          </a:effectRef>
-          <a:fontRef idx="minor">
-            <a:schemeClr val="lt1"/>
-          </a:fontRef>
-        </p:style>
-        <p:txBody>
-          <a:bodyPr rot="0" spcFirstLastPara="0" vertOverflow="overflow" horzOverflow="overflow" vert="horz" wrap="square" lIns="91440" tIns="45720" rIns="91440" bIns="45720" numCol="1" spcCol="0" rtlCol="0" fromWordArt="0" anchor="ctr" anchorCtr="0" forceAA="0" compatLnSpc="1">
-            <a:prstTxWarp prst="textNoShape">
-              <a:avLst/>
-            </a:prstTxWarp>
-            <a:noAutofit/>
-          </a:bodyPr>
-          <a:lstStyle/>
-          <a:p>
-            <a:pPr algn="ctr"/>
-            <a:endParaRPr lang="en-US">
-              <a:solidFill>
-                <a:schemeClr val="tx1"/>
-              </a:solidFill>
-            </a:endParaRPr>
-          </a:p>
-        </p:txBody>
-      </p:sp>
-      <p:sp>
-        <p:nvSpPr>
-          <p:cNvPr id="35" name="Circular Arrow 34">
-            <a:extLst>
-              <a:ext uri="{FF2B5EF4-FFF2-40B4-BE49-F238E27FC236}">
-                <a16:creationId xmlns:a16="http://schemas.microsoft.com/office/drawing/2014/main" id="{7A785EA8-8388-274A-9460-59940A60DC2A}"/>
-              </a:ext>
-            </a:extLst>
-          </p:cNvPr>
-          <p:cNvSpPr/>
-          <p:nvPr/>
-        </p:nvSpPr>
-        <p:spPr>
-          <a:xfrm rot="3167164">
-            <a:off x="2199646" y="170072"/>
-            <a:ext cx="898074" cy="916491"/>
-          </a:xfrm>
-          <a:prstGeom prst="circularArrow">
-            <a:avLst>
-              <a:gd name="adj1" fmla="val 4152"/>
-              <a:gd name="adj2" fmla="val 1142319"/>
-              <a:gd name="adj3" fmla="val 20436756"/>
-              <a:gd name="adj4" fmla="val 4971489"/>
-              <a:gd name="adj5" fmla="val 7562"/>
-            </a:avLst>
-          </a:prstGeom>
-          <a:ln>
-            <a:solidFill>
-              <a:schemeClr val="accent1"/>
-            </a:solidFill>
-          </a:ln>
-        </p:spPr>
-        <p:style>
-          <a:lnRef idx="2">
-            <a:schemeClr val="accent1">
-              <a:shade val="50000"/>
-            </a:schemeClr>
-          </a:lnRef>
-          <a:fillRef idx="1">
-            <a:schemeClr val="accent1"/>
-          </a:fillRef>
-          <a:effectRef idx="0">
-            <a:schemeClr val="accent1"/>
-          </a:effectRef>
-          <a:fontRef idx="minor">
-            <a:schemeClr val="lt1"/>
-          </a:fontRef>
-        </p:style>
-        <p:txBody>
-          <a:bodyPr rot="0" spcFirstLastPara="0" vertOverflow="overflow" horzOverflow="overflow" vert="horz" wrap="square" lIns="91440" tIns="45720" rIns="91440" bIns="45720" numCol="1" spcCol="0" rtlCol="0" fromWordArt="0" anchor="ctr" anchorCtr="0" forceAA="0" compatLnSpc="1">
-            <a:prstTxWarp prst="textNoShape">
-              <a:avLst/>
-            </a:prstTxWarp>
-            <a:noAutofit/>
-          </a:bodyPr>
-          <a:lstStyle/>
-          <a:p>
-            <a:pPr algn="ctr"/>
-            <a:endParaRPr lang="en-US">
-              <a:solidFill>
-                <a:schemeClr val="tx1"/>
-              </a:solidFill>
-            </a:endParaRPr>
-          </a:p>
-        </p:txBody>
-      </p:sp>
-      <p:sp>
-        <p:nvSpPr>
-          <p:cNvPr id="36" name="Circular Arrow 35">
-            <a:extLst>
-              <a:ext uri="{FF2B5EF4-FFF2-40B4-BE49-F238E27FC236}">
-                <a16:creationId xmlns:a16="http://schemas.microsoft.com/office/drawing/2014/main" id="{F97BFCC2-787B-7648-8D38-16E136198DC5}"/>
-              </a:ext>
-            </a:extLst>
-          </p:cNvPr>
-          <p:cNvSpPr/>
-          <p:nvPr/>
-        </p:nvSpPr>
-        <p:spPr>
-          <a:xfrm rot="10800000" flipH="1">
-            <a:off x="346783" y="3046685"/>
-            <a:ext cx="940537" cy="932949"/>
-          </a:xfrm>
-          <a:prstGeom prst="circularArrow">
-            <a:avLst>
-              <a:gd name="adj1" fmla="val 4152"/>
-              <a:gd name="adj2" fmla="val 1142319"/>
-              <a:gd name="adj3" fmla="val 20436756"/>
-              <a:gd name="adj4" fmla="val 4971489"/>
-              <a:gd name="adj5" fmla="val 7562"/>
-            </a:avLst>
-          </a:prstGeom>
-          <a:ln>
-            <a:solidFill>
-              <a:schemeClr val="accent1"/>
-            </a:solidFill>
-          </a:ln>
-        </p:spPr>
-        <p:style>
-          <a:lnRef idx="2">
-            <a:schemeClr val="accent1">
-              <a:shade val="50000"/>
-            </a:schemeClr>
-          </a:lnRef>
-          <a:fillRef idx="1">
-            <a:schemeClr val="accent1"/>
-          </a:fillRef>
-          <a:effectRef idx="0">
-            <a:schemeClr val="accent1"/>
-          </a:effectRef>
-          <a:fontRef idx="minor">
-            <a:schemeClr val="lt1"/>
-          </a:fontRef>
-        </p:style>
-        <p:txBody>
-          <a:bodyPr rot="0" spcFirstLastPara="0" vertOverflow="overflow" horzOverflow="overflow" vert="horz" wrap="square" lIns="91440" tIns="45720" rIns="91440" bIns="45720" numCol="1" spcCol="0" rtlCol="0" fromWordArt="0" anchor="ctr" anchorCtr="0" forceAA="0" compatLnSpc="1">
-            <a:prstTxWarp prst="textNoShape">
-              <a:avLst/>
-            </a:prstTxWarp>
-            <a:noAutofit/>
-          </a:bodyPr>
-          <a:lstStyle/>
-          <a:p>
-            <a:pPr algn="ctr"/>
-            <a:endParaRPr lang="en-US">
-              <a:solidFill>
-                <a:schemeClr val="tx1"/>
-              </a:solidFill>
-            </a:endParaRPr>
-          </a:p>
-        </p:txBody>
-      </p:sp>
-      <p:sp>
-        <p:nvSpPr>
-          <p:cNvPr id="37" name="TextBox 36">
-            <a:extLst>
-              <a:ext uri="{FF2B5EF4-FFF2-40B4-BE49-F238E27FC236}">
-                <a16:creationId xmlns:a16="http://schemas.microsoft.com/office/drawing/2014/main" id="{D43FF824-0833-D545-B7F4-A9B9B471E4D9}"/>
-              </a:ext>
-            </a:extLst>
-          </p:cNvPr>
-          <p:cNvSpPr txBox="1"/>
-          <p:nvPr/>
-        </p:nvSpPr>
-        <p:spPr>
-          <a:xfrm>
-            <a:off x="963027" y="2897754"/>
-            <a:ext cx="648587" cy="643084"/>
-          </a:xfrm>
-          <a:prstGeom prst="rect">
-            <a:avLst/>
-          </a:prstGeom>
-          <a:noFill/>
-        </p:spPr>
-        <p:txBody>
-          <a:bodyPr wrap="square" rtlCol="0">
-            <a:spAutoFit/>
-          </a:bodyPr>
-          <a:lstStyle/>
-          <a:p>
-            <a:r>
-              <a:rPr lang="en-US" sz="3600" dirty="0"/>
-              <a:t>n</a:t>
-            </a:r>
-            <a:r>
-              <a:rPr lang="en-US" sz="3600" baseline="-25000" dirty="0"/>
-              <a:t>1</a:t>
-            </a:r>
-            <a:endParaRPr lang="en-US" sz="3600" dirty="0"/>
-          </a:p>
-        </p:txBody>
-      </p:sp>
-      <p:sp>
-        <p:nvSpPr>
-          <p:cNvPr id="38" name="TextBox 37">
-            <a:extLst>
-              <a:ext uri="{FF2B5EF4-FFF2-40B4-BE49-F238E27FC236}">
-                <a16:creationId xmlns:a16="http://schemas.microsoft.com/office/drawing/2014/main" id="{FA0A8DE5-DF31-2446-863D-39B13783C804}"/>
-              </a:ext>
-            </a:extLst>
-          </p:cNvPr>
-          <p:cNvSpPr txBox="1"/>
-          <p:nvPr/>
-        </p:nvSpPr>
-        <p:spPr>
-          <a:xfrm>
-            <a:off x="2392641" y="775498"/>
-            <a:ext cx="648587" cy="643084"/>
-          </a:xfrm>
-          <a:prstGeom prst="rect">
-            <a:avLst/>
-          </a:prstGeom>
-          <a:noFill/>
-        </p:spPr>
-        <p:txBody>
-          <a:bodyPr wrap="square" rtlCol="0">
-            <a:spAutoFit/>
-          </a:bodyPr>
-          <a:lstStyle/>
-          <a:p>
-            <a:r>
-              <a:rPr lang="en-US" sz="3600" dirty="0"/>
-              <a:t>n</a:t>
-            </a:r>
-            <a:r>
-              <a:rPr lang="en-US" sz="3600" baseline="-25000" dirty="0"/>
-              <a:t>2</a:t>
-            </a:r>
-            <a:endParaRPr lang="en-US" sz="3600" dirty="0"/>
-          </a:p>
-        </p:txBody>
-      </p:sp>
-      <p:sp>
-        <p:nvSpPr>
-          <p:cNvPr id="39" name="TextBox 38">
-            <a:extLst>
-              <a:ext uri="{FF2B5EF4-FFF2-40B4-BE49-F238E27FC236}">
-                <a16:creationId xmlns:a16="http://schemas.microsoft.com/office/drawing/2014/main" id="{B298074A-B9FC-B940-AD02-A49FD44B72F5}"/>
-              </a:ext>
-            </a:extLst>
-          </p:cNvPr>
-          <p:cNvSpPr txBox="1"/>
-          <p:nvPr/>
-        </p:nvSpPr>
-        <p:spPr>
-          <a:xfrm>
-            <a:off x="3634317" y="2902797"/>
-            <a:ext cx="648587" cy="643084"/>
-          </a:xfrm>
-          <a:prstGeom prst="rect">
-            <a:avLst/>
-          </a:prstGeom>
-          <a:noFill/>
-        </p:spPr>
-        <p:txBody>
-          <a:bodyPr wrap="square" rtlCol="0">
-            <a:spAutoFit/>
-          </a:bodyPr>
-          <a:lstStyle/>
-          <a:p>
-            <a:r>
-              <a:rPr lang="en-US" sz="3600" dirty="0"/>
-              <a:t>n</a:t>
-            </a:r>
-            <a:r>
-              <a:rPr lang="en-US" sz="3600" baseline="-25000" dirty="0"/>
-              <a:t>3</a:t>
-            </a:r>
-            <a:endParaRPr lang="en-US" sz="3600" dirty="0"/>
-          </a:p>
-        </p:txBody>
-      </p:sp>
-      <p:sp>
-        <p:nvSpPr>
-          <p:cNvPr id="49" name="TextBox 48">
-            <a:extLst>
-              <a:ext uri="{FF2B5EF4-FFF2-40B4-BE49-F238E27FC236}">
-                <a16:creationId xmlns:a16="http://schemas.microsoft.com/office/drawing/2014/main" id="{D21F7D9C-485D-AF4F-A452-2BC1FA3C4867}"/>
-              </a:ext>
-            </a:extLst>
-          </p:cNvPr>
-          <p:cNvSpPr txBox="1"/>
-          <p:nvPr/>
-        </p:nvSpPr>
-        <p:spPr>
-          <a:xfrm>
-            <a:off x="1740157" y="1812994"/>
-            <a:ext cx="507938" cy="426438"/>
-          </a:xfrm>
-          <a:prstGeom prst="rect">
-            <a:avLst/>
-          </a:prstGeom>
-          <a:noFill/>
-        </p:spPr>
-        <p:txBody>
-          <a:bodyPr wrap="none" rtlCol="0">
-            <a:spAutoFit/>
-          </a:bodyPr>
-          <a:lstStyle/>
-          <a:p>
-            <a:r>
-              <a:rPr lang="en-US" sz="2800" dirty="0"/>
-              <a:t>⍺</a:t>
-            </a:r>
-            <a:r>
-              <a:rPr lang="en-US" sz="2800" baseline="-25000" dirty="0"/>
-              <a:t>12</a:t>
-            </a:r>
-            <a:endParaRPr lang="en-US" sz="2800" dirty="0"/>
-          </a:p>
-        </p:txBody>
-      </p:sp>
-      <p:grpSp>
-        <p:nvGrpSpPr>
-          <p:cNvPr id="60" name="Group 59">
-            <a:extLst>
-              <a:ext uri="{FF2B5EF4-FFF2-40B4-BE49-F238E27FC236}">
-                <a16:creationId xmlns:a16="http://schemas.microsoft.com/office/drawing/2014/main" id="{3C2F37EB-6C63-ED43-AFD4-5E12588A559C}"/>
-              </a:ext>
-            </a:extLst>
-          </p:cNvPr>
-          <p:cNvGrpSpPr/>
-          <p:nvPr/>
-        </p:nvGrpSpPr>
-        <p:grpSpPr>
-          <a:xfrm rot="21433182">
-            <a:off x="1118150" y="1797506"/>
-            <a:ext cx="2262057" cy="1831933"/>
-            <a:chOff x="1118150" y="1797506"/>
-            <a:chExt cx="2262057" cy="1831933"/>
-          </a:xfrm>
-        </p:grpSpPr>
-        <p:sp>
-          <p:nvSpPr>
-            <p:cNvPr id="57" name="Bent Arrow 56">
-              <a:extLst>
-                <a:ext uri="{FF2B5EF4-FFF2-40B4-BE49-F238E27FC236}">
-                  <a16:creationId xmlns:a16="http://schemas.microsoft.com/office/drawing/2014/main" id="{3E3ABB3A-799C-D846-BBDC-2AC039A3CC0F}"/>
+                  <a16:creationId xmlns:a16="http://schemas.microsoft.com/office/drawing/2014/main" id="{ACE409BC-F04B-F24E-BEEB-618C164D418C}"/>
                 </a:ext>
               </a:extLst>
             </p:cNvPr>
@@ -3468,43 +3115,23 @@
             <p:nvPr/>
           </p:nvSpPr>
           <p:spPr>
-            <a:xfrm rot="9208588">
-              <a:off x="1118150" y="1797506"/>
-              <a:ext cx="1896904" cy="1041266"/>
+            <a:xfrm rot="10800000">
+              <a:off x="3767804" y="3118880"/>
+              <a:ext cx="902608" cy="932949"/>
             </a:xfrm>
-            <a:prstGeom prst="bentArrow">
+            <a:prstGeom prst="circularArrow">
               <a:avLst>
-                <a:gd name="adj1" fmla="val 7674"/>
-                <a:gd name="adj2" fmla="val 9464"/>
-                <a:gd name="adj3" fmla="val 15590"/>
-                <a:gd name="adj4" fmla="val 78939"/>
+                <a:gd name="adj1" fmla="val 4152"/>
+                <a:gd name="adj2" fmla="val 1142319"/>
+                <a:gd name="adj3" fmla="val 20436756"/>
+                <a:gd name="adj4" fmla="val 4971489"/>
+                <a:gd name="adj5" fmla="val 7562"/>
               </a:avLst>
             </a:prstGeom>
-            <a:gradFill>
-              <a:gsLst>
-                <a:gs pos="100000">
-                  <a:schemeClr val="bg1"/>
-                </a:gs>
-                <a:gs pos="0">
-                  <a:schemeClr val="accent1"/>
-                </a:gs>
-                <a:gs pos="59000">
-                  <a:schemeClr val="accent1">
-                    <a:lumMod val="45000"/>
-                    <a:lumOff val="55000"/>
-                  </a:schemeClr>
-                </a:gs>
-                <a:gs pos="99000">
-                  <a:schemeClr val="accent1">
-                    <a:lumMod val="30000"/>
-                    <a:lumOff val="70000"/>
-                  </a:schemeClr>
-                </a:gs>
-              </a:gsLst>
-              <a:lin ang="10800000" scaled="0"/>
-            </a:gradFill>
             <a:ln>
-              <a:noFill/>
+              <a:solidFill>
+                <a:schemeClr val="accent1"/>
+              </a:solidFill>
             </a:ln>
           </p:spPr>
           <p:style>
@@ -3524,7 +3151,12 @@
             </a:fontRef>
           </p:style>
           <p:txBody>
-            <a:bodyPr rtlCol="0" anchor="ctr"/>
+            <a:bodyPr rot="0" spcFirstLastPara="0" vertOverflow="overflow" horzOverflow="overflow" vert="horz" wrap="square" lIns="91440" tIns="45720" rIns="91440" bIns="45720" numCol="1" spcCol="0" rtlCol="0" fromWordArt="0" anchor="ctr" anchorCtr="0" forceAA="0" compatLnSpc="1">
+              <a:prstTxWarp prst="textNoShape">
+                <a:avLst/>
+              </a:prstTxWarp>
+              <a:noAutofit/>
+            </a:bodyPr>
             <a:lstStyle/>
             <a:p>
               <a:pPr algn="ctr"/>
@@ -3538,10 +3170,10 @@
         </p:sp>
         <p:sp>
           <p:nvSpPr>
-            <p:cNvPr id="59" name="Bent Arrow 58">
+            <p:cNvPr id="35" name="Circular Arrow 34">
               <a:extLst>
                 <a:ext uri="{FF2B5EF4-FFF2-40B4-BE49-F238E27FC236}">
-                  <a16:creationId xmlns:a16="http://schemas.microsoft.com/office/drawing/2014/main" id="{68CA5DD6-57EA-9B4E-A09D-8ADA1A928C35}"/>
+                  <a16:creationId xmlns:a16="http://schemas.microsoft.com/office/drawing/2014/main" id="{7A785EA8-8388-274A-9460-59940A60DC2A}"/>
                 </a:ext>
               </a:extLst>
             </p:cNvPr>
@@ -3549,43 +3181,23 @@
             <p:nvPr/>
           </p:nvSpPr>
           <p:spPr>
-            <a:xfrm rot="9347775" flipV="1">
-              <a:off x="1483303" y="2588173"/>
-              <a:ext cx="1896904" cy="1041266"/>
+            <a:xfrm rot="3167164">
+              <a:off x="2199646" y="170072"/>
+              <a:ext cx="898074" cy="916491"/>
             </a:xfrm>
-            <a:prstGeom prst="bentArrow">
+            <a:prstGeom prst="circularArrow">
               <a:avLst>
-                <a:gd name="adj1" fmla="val 7674"/>
-                <a:gd name="adj2" fmla="val 9464"/>
-                <a:gd name="adj3" fmla="val 15590"/>
-                <a:gd name="adj4" fmla="val 78939"/>
+                <a:gd name="adj1" fmla="val 4152"/>
+                <a:gd name="adj2" fmla="val 1142319"/>
+                <a:gd name="adj3" fmla="val 20436756"/>
+                <a:gd name="adj4" fmla="val 4971489"/>
+                <a:gd name="adj5" fmla="val 7562"/>
               </a:avLst>
             </a:prstGeom>
-            <a:gradFill>
-              <a:gsLst>
-                <a:gs pos="100000">
-                  <a:schemeClr val="bg1"/>
-                </a:gs>
-                <a:gs pos="0">
-                  <a:schemeClr val="accent1"/>
-                </a:gs>
-                <a:gs pos="59000">
-                  <a:schemeClr val="accent1">
-                    <a:lumMod val="45000"/>
-                    <a:lumOff val="55000"/>
-                  </a:schemeClr>
-                </a:gs>
-                <a:gs pos="99000">
-                  <a:schemeClr val="accent1">
-                    <a:lumMod val="30000"/>
-                    <a:lumOff val="70000"/>
-                  </a:schemeClr>
-                </a:gs>
-              </a:gsLst>
-              <a:lin ang="10800000" scaled="0"/>
-            </a:gradFill>
             <a:ln>
-              <a:noFill/>
+              <a:solidFill>
+                <a:schemeClr val="accent1"/>
+              </a:solidFill>
             </a:ln>
           </p:spPr>
           <p:style>
@@ -3605,7 +3217,12 @@
             </a:fontRef>
           </p:style>
           <p:txBody>
-            <a:bodyPr rtlCol="0" anchor="ctr"/>
+            <a:bodyPr rot="0" spcFirstLastPara="0" vertOverflow="overflow" horzOverflow="overflow" vert="horz" wrap="square" lIns="91440" tIns="45720" rIns="91440" bIns="45720" numCol="1" spcCol="0" rtlCol="0" fromWordArt="0" anchor="ctr" anchorCtr="0" forceAA="0" compatLnSpc="1">
+              <a:prstTxWarp prst="textNoShape">
+                <a:avLst/>
+              </a:prstTxWarp>
+              <a:noAutofit/>
+            </a:bodyPr>
             <a:lstStyle/>
             <a:p>
               <a:pPr algn="ctr"/>
@@ -3617,309 +3234,718 @@
             </a:p>
           </p:txBody>
         </p:sp>
-      </p:grpSp>
-      <p:sp>
-        <p:nvSpPr>
-          <p:cNvPr id="64" name="TextBox 63">
-            <a:extLst>
-              <a:ext uri="{FF2B5EF4-FFF2-40B4-BE49-F238E27FC236}">
-                <a16:creationId xmlns:a16="http://schemas.microsoft.com/office/drawing/2014/main" id="{66C20AFD-468A-6348-B632-B105EA3F9B61}"/>
-              </a:ext>
-            </a:extLst>
-          </p:cNvPr>
-          <p:cNvSpPr txBox="1"/>
-          <p:nvPr/>
-        </p:nvSpPr>
-        <p:spPr>
-          <a:xfrm>
-            <a:off x="2119433" y="2684302"/>
-            <a:ext cx="885179" cy="523220"/>
-          </a:xfrm>
-          <a:prstGeom prst="rect">
-            <a:avLst/>
-          </a:prstGeom>
-          <a:noFill/>
-        </p:spPr>
-        <p:txBody>
-          <a:bodyPr wrap="none" rtlCol="0">
-            <a:spAutoFit/>
-          </a:bodyPr>
-          <a:lstStyle/>
-          <a:p>
-            <a:r>
-              <a:rPr lang="en-US" sz="2800" dirty="0"/>
-              <a:t>β</a:t>
-            </a:r>
-            <a:r>
-              <a:rPr lang="en-US" sz="2800" baseline="-25000" dirty="0"/>
-              <a:t>1(23)</a:t>
-            </a:r>
-            <a:endParaRPr lang="en-US" sz="2800" dirty="0"/>
-          </a:p>
-        </p:txBody>
-      </p:sp>
-      <p:grpSp>
-        <p:nvGrpSpPr>
-          <p:cNvPr id="69" name="Group 68">
-            <a:extLst>
-              <a:ext uri="{FF2B5EF4-FFF2-40B4-BE49-F238E27FC236}">
-                <a16:creationId xmlns:a16="http://schemas.microsoft.com/office/drawing/2014/main" id="{DCF7742A-BEB7-2144-ABAA-ED768A140164}"/>
-              </a:ext>
-            </a:extLst>
-          </p:cNvPr>
-          <p:cNvGrpSpPr/>
-          <p:nvPr/>
-        </p:nvGrpSpPr>
-        <p:grpSpPr>
-          <a:xfrm rot="259663" flipH="1">
-            <a:off x="2932696" y="1186748"/>
-            <a:ext cx="1467694" cy="1753684"/>
-            <a:chOff x="941488" y="1198743"/>
-            <a:chExt cx="1467694" cy="1753684"/>
-          </a:xfrm>
-        </p:grpSpPr>
-        <p:cxnSp>
-          <p:nvCxnSpPr>
-            <p:cNvPr id="70" name="Straight Arrow Connector 69">
+        <p:sp>
+          <p:nvSpPr>
+            <p:cNvPr id="36" name="Circular Arrow 35">
               <a:extLst>
                 <a:ext uri="{FF2B5EF4-FFF2-40B4-BE49-F238E27FC236}">
-                  <a16:creationId xmlns:a16="http://schemas.microsoft.com/office/drawing/2014/main" id="{995DD8C1-A249-DB40-9B0D-AF6DA1541808}"/>
+                  <a16:creationId xmlns:a16="http://schemas.microsoft.com/office/drawing/2014/main" id="{F97BFCC2-787B-7648-8D38-16E136198DC5}"/>
                 </a:ext>
               </a:extLst>
             </p:cNvPr>
-            <p:cNvCxnSpPr>
-              <a:cxnSpLocks/>
-            </p:cNvCxnSpPr>
+            <p:cNvSpPr/>
             <p:nvPr/>
-          </p:nvCxnSpPr>
+          </p:nvSpPr>
           <p:spPr>
-            <a:xfrm rot="21382894" flipH="1">
-              <a:off x="1087588" y="1413667"/>
-              <a:ext cx="1321594" cy="1538760"/>
+            <a:xfrm rot="10800000" flipH="1">
+              <a:off x="378867" y="3118881"/>
+              <a:ext cx="940537" cy="932949"/>
             </a:xfrm>
-            <a:prstGeom prst="straightConnector1">
-              <a:avLst/>
+            <a:prstGeom prst="circularArrow">
+              <a:avLst>
+                <a:gd name="adj1" fmla="val 4152"/>
+                <a:gd name="adj2" fmla="val 1142319"/>
+                <a:gd name="adj3" fmla="val 20436756"/>
+                <a:gd name="adj4" fmla="val 4971489"/>
+                <a:gd name="adj5" fmla="val 7562"/>
+              </a:avLst>
             </a:prstGeom>
-            <a:ln w="53975">
+            <a:ln>
               <a:solidFill>
                 <a:schemeClr val="accent1"/>
               </a:solidFill>
-              <a:headEnd type="none"/>
-              <a:tailEnd type="triangle"/>
             </a:ln>
           </p:spPr>
           <p:style>
-            <a:lnRef idx="1">
-              <a:schemeClr val="accent1"/>
+            <a:lnRef idx="2">
+              <a:schemeClr val="accent1">
+                <a:shade val="50000"/>
+              </a:schemeClr>
             </a:lnRef>
-            <a:fillRef idx="0">
+            <a:fillRef idx="1">
               <a:schemeClr val="accent1"/>
             </a:fillRef>
             <a:effectRef idx="0">
               <a:schemeClr val="accent1"/>
             </a:effectRef>
             <a:fontRef idx="minor">
-              <a:schemeClr val="tx1"/>
+              <a:schemeClr val="lt1"/>
             </a:fontRef>
           </p:style>
-        </p:cxnSp>
-        <p:cxnSp>
-          <p:nvCxnSpPr>
-            <p:cNvPr id="71" name="Straight Arrow Connector 70">
+          <p:txBody>
+            <a:bodyPr rot="0" spcFirstLastPara="0" vertOverflow="overflow" horzOverflow="overflow" vert="horz" wrap="square" lIns="91440" tIns="45720" rIns="91440" bIns="45720" numCol="1" spcCol="0" rtlCol="0" fromWordArt="0" anchor="ctr" anchorCtr="0" forceAA="0" compatLnSpc="1">
+              <a:prstTxWarp prst="textNoShape">
+                <a:avLst/>
+              </a:prstTxWarp>
+              <a:noAutofit/>
+            </a:bodyPr>
+            <a:lstStyle/>
+            <a:p>
+              <a:pPr algn="ctr"/>
+              <a:endParaRPr lang="en-US">
+                <a:solidFill>
+                  <a:schemeClr val="tx1"/>
+                </a:solidFill>
+              </a:endParaRPr>
+            </a:p>
+          </p:txBody>
+        </p:sp>
+        <p:sp>
+          <p:nvSpPr>
+            <p:cNvPr id="37" name="TextBox 36">
               <a:extLst>
                 <a:ext uri="{FF2B5EF4-FFF2-40B4-BE49-F238E27FC236}">
-                  <a16:creationId xmlns:a16="http://schemas.microsoft.com/office/drawing/2014/main" id="{00C6A85A-A449-8748-AD47-4B94921A8591}"/>
+                  <a16:creationId xmlns:a16="http://schemas.microsoft.com/office/drawing/2014/main" id="{D43FF824-0833-D545-B7F4-A9B9B471E4D9}"/>
                 </a:ext>
               </a:extLst>
             </p:cNvPr>
-            <p:cNvCxnSpPr>
-              <a:cxnSpLocks/>
-            </p:cNvCxnSpPr>
+            <p:cNvSpPr txBox="1"/>
             <p:nvPr/>
-          </p:nvCxnSpPr>
+          </p:nvSpPr>
           <p:spPr>
-            <a:xfrm rot="21382894" flipH="1">
-              <a:off x="941488" y="1198743"/>
-              <a:ext cx="1321594" cy="1538760"/>
+            <a:xfrm>
+              <a:off x="963028" y="2877543"/>
+              <a:ext cx="635706" cy="665817"/>
             </a:xfrm>
-            <a:prstGeom prst="straightConnector1">
+            <a:prstGeom prst="rect">
               <a:avLst/>
             </a:prstGeom>
-            <a:ln w="53975">
-              <a:solidFill>
-                <a:schemeClr val="accent1"/>
-              </a:solidFill>
-              <a:headEnd type="triangle"/>
-              <a:tailEnd type="none"/>
-            </a:ln>
+            <a:noFill/>
           </p:spPr>
-          <p:style>
-            <a:lnRef idx="1">
-              <a:schemeClr val="accent1"/>
-            </a:lnRef>
-            <a:fillRef idx="0">
-              <a:schemeClr val="accent1"/>
-            </a:fillRef>
-            <a:effectRef idx="0">
-              <a:schemeClr val="accent1"/>
-            </a:effectRef>
-            <a:fontRef idx="minor">
-              <a:schemeClr val="tx1"/>
-            </a:fontRef>
-          </p:style>
-        </p:cxnSp>
-      </p:grpSp>
-      <p:grpSp>
-        <p:nvGrpSpPr>
-          <p:cNvPr id="72" name="Group 71">
-            <a:extLst>
-              <a:ext uri="{FF2B5EF4-FFF2-40B4-BE49-F238E27FC236}">
-                <a16:creationId xmlns:a16="http://schemas.microsoft.com/office/drawing/2014/main" id="{59970A83-7836-8F44-AACC-F913E8AD93E6}"/>
-              </a:ext>
-            </a:extLst>
-          </p:cNvPr>
-          <p:cNvGrpSpPr/>
-          <p:nvPr/>
-        </p:nvGrpSpPr>
-        <p:grpSpPr>
-          <a:xfrm rot="3236689">
-            <a:off x="1829655" y="2687428"/>
-            <a:ext cx="1467694" cy="1753684"/>
-            <a:chOff x="941488" y="1198743"/>
-            <a:chExt cx="1467694" cy="1753684"/>
-          </a:xfrm>
-        </p:grpSpPr>
-        <p:cxnSp>
-          <p:nvCxnSpPr>
-            <p:cNvPr id="73" name="Straight Arrow Connector 72">
+          <p:txBody>
+            <a:bodyPr wrap="square" rtlCol="0">
+              <a:spAutoFit/>
+            </a:bodyPr>
+            <a:lstStyle/>
+            <a:p>
+              <a:r>
+                <a:rPr lang="en-US" sz="3600" dirty="0"/>
+                <a:t>n</a:t>
+              </a:r>
+              <a:r>
+                <a:rPr lang="en-US" sz="3600" baseline="-25000" dirty="0"/>
+                <a:t>1</a:t>
+              </a:r>
+              <a:endParaRPr lang="en-US" sz="3600" dirty="0"/>
+            </a:p>
+          </p:txBody>
+        </p:sp>
+        <p:sp>
+          <p:nvSpPr>
+            <p:cNvPr id="38" name="TextBox 37">
               <a:extLst>
                 <a:ext uri="{FF2B5EF4-FFF2-40B4-BE49-F238E27FC236}">
-                  <a16:creationId xmlns:a16="http://schemas.microsoft.com/office/drawing/2014/main" id="{C65A25F4-626F-3F41-9740-DA61416C7012}"/>
+                  <a16:creationId xmlns:a16="http://schemas.microsoft.com/office/drawing/2014/main" id="{FA0A8DE5-DF31-2446-863D-39B13783C804}"/>
                 </a:ext>
               </a:extLst>
             </p:cNvPr>
-            <p:cNvCxnSpPr>
-              <a:cxnSpLocks/>
-            </p:cNvCxnSpPr>
+            <p:cNvSpPr txBox="1"/>
             <p:nvPr/>
-          </p:nvCxnSpPr>
+          </p:nvSpPr>
           <p:spPr>
-            <a:xfrm rot="21382894" flipH="1">
-              <a:off x="1087588" y="1413667"/>
-              <a:ext cx="1321594" cy="1538760"/>
+            <a:xfrm>
+              <a:off x="2392641" y="775498"/>
+              <a:ext cx="648587" cy="643084"/>
             </a:xfrm>
-            <a:prstGeom prst="straightConnector1">
+            <a:prstGeom prst="rect">
               <a:avLst/>
             </a:prstGeom>
-            <a:ln w="53975">
-              <a:solidFill>
-                <a:schemeClr val="accent1"/>
-              </a:solidFill>
-              <a:headEnd type="none"/>
-              <a:tailEnd type="triangle"/>
-            </a:ln>
+            <a:noFill/>
           </p:spPr>
-          <p:style>
-            <a:lnRef idx="1">
-              <a:schemeClr val="accent1"/>
-            </a:lnRef>
-            <a:fillRef idx="0">
-              <a:schemeClr val="accent1"/>
-            </a:fillRef>
-            <a:effectRef idx="0">
-              <a:schemeClr val="accent1"/>
-            </a:effectRef>
-            <a:fontRef idx="minor">
-              <a:schemeClr val="tx1"/>
-            </a:fontRef>
-          </p:style>
-        </p:cxnSp>
-        <p:cxnSp>
-          <p:nvCxnSpPr>
-            <p:cNvPr id="74" name="Straight Arrow Connector 73">
+          <p:txBody>
+            <a:bodyPr wrap="square" rtlCol="0">
+              <a:spAutoFit/>
+            </a:bodyPr>
+            <a:lstStyle/>
+            <a:p>
+              <a:r>
+                <a:rPr lang="en-US" sz="3600" dirty="0"/>
+                <a:t>n</a:t>
+              </a:r>
+              <a:r>
+                <a:rPr lang="en-US" sz="3600" baseline="-25000" dirty="0"/>
+                <a:t>2</a:t>
+              </a:r>
+              <a:endParaRPr lang="en-US" sz="3600" dirty="0"/>
+            </a:p>
+          </p:txBody>
+        </p:sp>
+        <p:sp>
+          <p:nvSpPr>
+            <p:cNvPr id="39" name="TextBox 38">
               <a:extLst>
                 <a:ext uri="{FF2B5EF4-FFF2-40B4-BE49-F238E27FC236}">
-                  <a16:creationId xmlns:a16="http://schemas.microsoft.com/office/drawing/2014/main" id="{7213D65A-170C-F24C-98A9-4BF501ECD658}"/>
+                  <a16:creationId xmlns:a16="http://schemas.microsoft.com/office/drawing/2014/main" id="{B298074A-B9FC-B940-AD02-A49FD44B72F5}"/>
                 </a:ext>
               </a:extLst>
             </p:cNvPr>
-            <p:cNvCxnSpPr>
-              <a:cxnSpLocks/>
-            </p:cNvCxnSpPr>
+            <p:cNvSpPr txBox="1"/>
             <p:nvPr/>
-          </p:nvCxnSpPr>
+          </p:nvSpPr>
           <p:spPr>
-            <a:xfrm rot="21382894" flipH="1">
-              <a:off x="941488" y="1198743"/>
-              <a:ext cx="1321594" cy="1538760"/>
+            <a:xfrm>
+              <a:off x="3634317" y="2888909"/>
+              <a:ext cx="648587" cy="643084"/>
             </a:xfrm>
-            <a:prstGeom prst="straightConnector1">
+            <a:prstGeom prst="rect">
               <a:avLst/>
             </a:prstGeom>
-            <a:ln w="53975">
-              <a:solidFill>
+            <a:noFill/>
+          </p:spPr>
+          <p:txBody>
+            <a:bodyPr wrap="square" rtlCol="0">
+              <a:spAutoFit/>
+            </a:bodyPr>
+            <a:lstStyle/>
+            <a:p>
+              <a:r>
+                <a:rPr lang="en-US" sz="3600" dirty="0"/>
+                <a:t>n</a:t>
+              </a:r>
+              <a:r>
+                <a:rPr lang="en-US" sz="3600" baseline="-25000" dirty="0"/>
+                <a:t>3</a:t>
+              </a:r>
+              <a:endParaRPr lang="en-US" sz="3600" dirty="0"/>
+            </a:p>
+          </p:txBody>
+        </p:sp>
+        <p:sp>
+          <p:nvSpPr>
+            <p:cNvPr id="49" name="TextBox 48">
+              <a:extLst>
+                <a:ext uri="{FF2B5EF4-FFF2-40B4-BE49-F238E27FC236}">
+                  <a16:creationId xmlns:a16="http://schemas.microsoft.com/office/drawing/2014/main" id="{D21F7D9C-485D-AF4F-A452-2BC1FA3C4867}"/>
+                </a:ext>
+              </a:extLst>
+            </p:cNvPr>
+            <p:cNvSpPr txBox="1"/>
+            <p:nvPr/>
+          </p:nvSpPr>
+          <p:spPr>
+            <a:xfrm>
+              <a:off x="843878" y="1501761"/>
+              <a:ext cx="507938" cy="426438"/>
+            </a:xfrm>
+            <a:prstGeom prst="rect">
+              <a:avLst/>
+            </a:prstGeom>
+            <a:noFill/>
+          </p:spPr>
+          <p:txBody>
+            <a:bodyPr wrap="none" rtlCol="0">
+              <a:spAutoFit/>
+            </a:bodyPr>
+            <a:lstStyle/>
+            <a:p>
+              <a:r>
+                <a:rPr lang="en-US" sz="2800" dirty="0"/>
+                <a:t>⍺</a:t>
+              </a:r>
+              <a:r>
+                <a:rPr lang="en-US" sz="2800" baseline="-25000" dirty="0"/>
+                <a:t>12</a:t>
+              </a:r>
+              <a:endParaRPr lang="en-US" sz="2800" dirty="0"/>
+            </a:p>
+          </p:txBody>
+        </p:sp>
+        <p:grpSp>
+          <p:nvGrpSpPr>
+            <p:cNvPr id="60" name="Group 59">
+              <a:extLst>
+                <a:ext uri="{FF2B5EF4-FFF2-40B4-BE49-F238E27FC236}">
+                  <a16:creationId xmlns:a16="http://schemas.microsoft.com/office/drawing/2014/main" id="{3C2F37EB-6C63-ED43-AFD4-5E12588A559C}"/>
+                </a:ext>
+              </a:extLst>
+            </p:cNvPr>
+            <p:cNvGrpSpPr/>
+            <p:nvPr/>
+          </p:nvGrpSpPr>
+          <p:grpSpPr>
+            <a:xfrm rot="21433182">
+              <a:off x="1118150" y="1797506"/>
+              <a:ext cx="2262057" cy="1831933"/>
+              <a:chOff x="1118150" y="1797506"/>
+              <a:chExt cx="2262057" cy="1831933"/>
+            </a:xfrm>
+          </p:grpSpPr>
+          <p:sp>
+            <p:nvSpPr>
+              <p:cNvPr id="57" name="Bent Arrow 56">
+                <a:extLst>
+                  <a:ext uri="{FF2B5EF4-FFF2-40B4-BE49-F238E27FC236}">
+                    <a16:creationId xmlns:a16="http://schemas.microsoft.com/office/drawing/2014/main" id="{3E3ABB3A-799C-D846-BBDC-2AC039A3CC0F}"/>
+                  </a:ext>
+                </a:extLst>
+              </p:cNvPr>
+              <p:cNvSpPr/>
+              <p:nvPr/>
+            </p:nvSpPr>
+            <p:spPr>
+              <a:xfrm rot="9208588">
+                <a:off x="1118150" y="1797506"/>
+                <a:ext cx="1896904" cy="1041266"/>
+              </a:xfrm>
+              <a:prstGeom prst="bentArrow">
+                <a:avLst>
+                  <a:gd name="adj1" fmla="val 7674"/>
+                  <a:gd name="adj2" fmla="val 9464"/>
+                  <a:gd name="adj3" fmla="val 15590"/>
+                  <a:gd name="adj4" fmla="val 78939"/>
+                </a:avLst>
+              </a:prstGeom>
+              <a:gradFill>
+                <a:gsLst>
+                  <a:gs pos="100000">
+                    <a:schemeClr val="bg1"/>
+                  </a:gs>
+                  <a:gs pos="0">
+                    <a:schemeClr val="accent1"/>
+                  </a:gs>
+                  <a:gs pos="59000">
+                    <a:schemeClr val="accent1">
+                      <a:lumMod val="45000"/>
+                      <a:lumOff val="55000"/>
+                    </a:schemeClr>
+                  </a:gs>
+                  <a:gs pos="99000">
+                    <a:schemeClr val="accent1">
+                      <a:lumMod val="30000"/>
+                      <a:lumOff val="70000"/>
+                    </a:schemeClr>
+                  </a:gs>
+                </a:gsLst>
+                <a:lin ang="10800000" scaled="0"/>
+              </a:gradFill>
+              <a:ln>
+                <a:noFill/>
+              </a:ln>
+            </p:spPr>
+            <p:style>
+              <a:lnRef idx="2">
+                <a:schemeClr val="accent1">
+                  <a:shade val="50000"/>
+                </a:schemeClr>
+              </a:lnRef>
+              <a:fillRef idx="1">
                 <a:schemeClr val="accent1"/>
-              </a:solidFill>
-              <a:headEnd type="triangle"/>
-              <a:tailEnd type="none"/>
-            </a:ln>
+              </a:fillRef>
+              <a:effectRef idx="0">
+                <a:schemeClr val="accent1"/>
+              </a:effectRef>
+              <a:fontRef idx="minor">
+                <a:schemeClr val="lt1"/>
+              </a:fontRef>
+            </p:style>
+            <p:txBody>
+              <a:bodyPr rtlCol="0" anchor="ctr"/>
+              <a:lstStyle/>
+              <a:p>
+                <a:pPr algn="ctr"/>
+                <a:endParaRPr lang="en-US">
+                  <a:solidFill>
+                    <a:schemeClr val="tx1"/>
+                  </a:solidFill>
+                </a:endParaRPr>
+              </a:p>
+            </p:txBody>
+          </p:sp>
+          <p:sp>
+            <p:nvSpPr>
+              <p:cNvPr id="59" name="Bent Arrow 58">
+                <a:extLst>
+                  <a:ext uri="{FF2B5EF4-FFF2-40B4-BE49-F238E27FC236}">
+                    <a16:creationId xmlns:a16="http://schemas.microsoft.com/office/drawing/2014/main" id="{68CA5DD6-57EA-9B4E-A09D-8ADA1A928C35}"/>
+                  </a:ext>
+                </a:extLst>
+              </p:cNvPr>
+              <p:cNvSpPr/>
+              <p:nvPr/>
+            </p:nvSpPr>
+            <p:spPr>
+              <a:xfrm rot="9347775" flipV="1">
+                <a:off x="1483303" y="2588173"/>
+                <a:ext cx="1896904" cy="1041266"/>
+              </a:xfrm>
+              <a:prstGeom prst="bentArrow">
+                <a:avLst>
+                  <a:gd name="adj1" fmla="val 7674"/>
+                  <a:gd name="adj2" fmla="val 9464"/>
+                  <a:gd name="adj3" fmla="val 15590"/>
+                  <a:gd name="adj4" fmla="val 78939"/>
+                </a:avLst>
+              </a:prstGeom>
+              <a:gradFill>
+                <a:gsLst>
+                  <a:gs pos="100000">
+                    <a:schemeClr val="bg1"/>
+                  </a:gs>
+                  <a:gs pos="0">
+                    <a:schemeClr val="accent1"/>
+                  </a:gs>
+                  <a:gs pos="59000">
+                    <a:schemeClr val="accent1">
+                      <a:lumMod val="45000"/>
+                      <a:lumOff val="55000"/>
+                    </a:schemeClr>
+                  </a:gs>
+                  <a:gs pos="99000">
+                    <a:schemeClr val="accent1">
+                      <a:lumMod val="30000"/>
+                      <a:lumOff val="70000"/>
+                    </a:schemeClr>
+                  </a:gs>
+                </a:gsLst>
+                <a:lin ang="10800000" scaled="0"/>
+              </a:gradFill>
+              <a:ln>
+                <a:noFill/>
+              </a:ln>
+            </p:spPr>
+            <p:style>
+              <a:lnRef idx="2">
+                <a:schemeClr val="accent1">
+                  <a:shade val="50000"/>
+                </a:schemeClr>
+              </a:lnRef>
+              <a:fillRef idx="1">
+                <a:schemeClr val="accent1"/>
+              </a:fillRef>
+              <a:effectRef idx="0">
+                <a:schemeClr val="accent1"/>
+              </a:effectRef>
+              <a:fontRef idx="minor">
+                <a:schemeClr val="lt1"/>
+              </a:fontRef>
+            </p:style>
+            <p:txBody>
+              <a:bodyPr rtlCol="0" anchor="ctr"/>
+              <a:lstStyle/>
+              <a:p>
+                <a:pPr algn="ctr"/>
+                <a:endParaRPr lang="en-US">
+                  <a:solidFill>
+                    <a:schemeClr val="tx1"/>
+                  </a:solidFill>
+                </a:endParaRPr>
+              </a:p>
+            </p:txBody>
+          </p:sp>
+        </p:grpSp>
+        <p:sp>
+          <p:nvSpPr>
+            <p:cNvPr id="64" name="TextBox 63">
+              <a:extLst>
+                <a:ext uri="{FF2B5EF4-FFF2-40B4-BE49-F238E27FC236}">
+                  <a16:creationId xmlns:a16="http://schemas.microsoft.com/office/drawing/2014/main" id="{66C20AFD-468A-6348-B632-B105EA3F9B61}"/>
+                </a:ext>
+              </a:extLst>
+            </p:cNvPr>
+            <p:cNvSpPr txBox="1"/>
+            <p:nvPr/>
+          </p:nvSpPr>
+          <p:spPr>
+            <a:xfrm>
+              <a:off x="2119433" y="2684302"/>
+              <a:ext cx="885179" cy="523220"/>
+            </a:xfrm>
+            <a:prstGeom prst="rect">
+              <a:avLst/>
+            </a:prstGeom>
+            <a:noFill/>
           </p:spPr>
-          <p:style>
-            <a:lnRef idx="1">
-              <a:schemeClr val="accent1"/>
-            </a:lnRef>
-            <a:fillRef idx="0">
-              <a:schemeClr val="accent1"/>
-            </a:fillRef>
-            <a:effectRef idx="0">
-              <a:schemeClr val="accent1"/>
-            </a:effectRef>
-            <a:fontRef idx="minor">
-              <a:schemeClr val="tx1"/>
-            </a:fontRef>
-          </p:style>
-        </p:cxnSp>
+          <p:txBody>
+            <a:bodyPr wrap="none" rtlCol="0">
+              <a:spAutoFit/>
+            </a:bodyPr>
+            <a:lstStyle/>
+            <a:p>
+              <a:r>
+                <a:rPr lang="en-US" sz="2800" dirty="0"/>
+                <a:t>β</a:t>
+              </a:r>
+              <a:r>
+                <a:rPr lang="en-US" sz="2800" baseline="-25000" dirty="0"/>
+                <a:t>1(23)</a:t>
+              </a:r>
+              <a:endParaRPr lang="en-US" sz="2800" dirty="0"/>
+            </a:p>
+          </p:txBody>
+        </p:sp>
+        <p:grpSp>
+          <p:nvGrpSpPr>
+            <p:cNvPr id="69" name="Group 68">
+              <a:extLst>
+                <a:ext uri="{FF2B5EF4-FFF2-40B4-BE49-F238E27FC236}">
+                  <a16:creationId xmlns:a16="http://schemas.microsoft.com/office/drawing/2014/main" id="{DCF7742A-BEB7-2144-ABAA-ED768A140164}"/>
+                </a:ext>
+              </a:extLst>
+            </p:cNvPr>
+            <p:cNvGrpSpPr/>
+            <p:nvPr/>
+          </p:nvGrpSpPr>
+          <p:grpSpPr>
+            <a:xfrm rot="259663" flipH="1">
+              <a:off x="2932696" y="1186748"/>
+              <a:ext cx="1467694" cy="1753684"/>
+              <a:chOff x="941488" y="1198743"/>
+              <a:chExt cx="1467694" cy="1753684"/>
+            </a:xfrm>
+          </p:grpSpPr>
+          <p:cxnSp>
+            <p:nvCxnSpPr>
+              <p:cNvPr id="70" name="Straight Arrow Connector 69">
+                <a:extLst>
+                  <a:ext uri="{FF2B5EF4-FFF2-40B4-BE49-F238E27FC236}">
+                    <a16:creationId xmlns:a16="http://schemas.microsoft.com/office/drawing/2014/main" id="{995DD8C1-A249-DB40-9B0D-AF6DA1541808}"/>
+                  </a:ext>
+                </a:extLst>
+              </p:cNvPr>
+              <p:cNvCxnSpPr>
+                <a:cxnSpLocks/>
+              </p:cNvCxnSpPr>
+              <p:nvPr/>
+            </p:nvCxnSpPr>
+            <p:spPr>
+              <a:xfrm rot="21382894" flipH="1">
+                <a:off x="1087588" y="1413667"/>
+                <a:ext cx="1321594" cy="1538760"/>
+              </a:xfrm>
+              <a:prstGeom prst="straightConnector1">
+                <a:avLst/>
+              </a:prstGeom>
+              <a:ln w="53975">
+                <a:solidFill>
+                  <a:schemeClr val="accent1"/>
+                </a:solidFill>
+                <a:headEnd type="none"/>
+                <a:tailEnd type="triangle"/>
+              </a:ln>
+            </p:spPr>
+            <p:style>
+              <a:lnRef idx="1">
+                <a:schemeClr val="accent1"/>
+              </a:lnRef>
+              <a:fillRef idx="0">
+                <a:schemeClr val="accent1"/>
+              </a:fillRef>
+              <a:effectRef idx="0">
+                <a:schemeClr val="accent1"/>
+              </a:effectRef>
+              <a:fontRef idx="minor">
+                <a:schemeClr val="tx1"/>
+              </a:fontRef>
+            </p:style>
+          </p:cxnSp>
+          <p:cxnSp>
+            <p:nvCxnSpPr>
+              <p:cNvPr id="71" name="Straight Arrow Connector 70">
+                <a:extLst>
+                  <a:ext uri="{FF2B5EF4-FFF2-40B4-BE49-F238E27FC236}">
+                    <a16:creationId xmlns:a16="http://schemas.microsoft.com/office/drawing/2014/main" id="{00C6A85A-A449-8748-AD47-4B94921A8591}"/>
+                  </a:ext>
+                </a:extLst>
+              </p:cNvPr>
+              <p:cNvCxnSpPr>
+                <a:cxnSpLocks/>
+              </p:cNvCxnSpPr>
+              <p:nvPr/>
+            </p:nvCxnSpPr>
+            <p:spPr>
+              <a:xfrm rot="21382894" flipH="1">
+                <a:off x="941488" y="1198743"/>
+                <a:ext cx="1321594" cy="1538760"/>
+              </a:xfrm>
+              <a:prstGeom prst="straightConnector1">
+                <a:avLst/>
+              </a:prstGeom>
+              <a:ln w="53975">
+                <a:solidFill>
+                  <a:schemeClr val="accent1"/>
+                </a:solidFill>
+                <a:headEnd type="triangle"/>
+                <a:tailEnd type="none"/>
+              </a:ln>
+            </p:spPr>
+            <p:style>
+              <a:lnRef idx="1">
+                <a:schemeClr val="accent1"/>
+              </a:lnRef>
+              <a:fillRef idx="0">
+                <a:schemeClr val="accent1"/>
+              </a:fillRef>
+              <a:effectRef idx="0">
+                <a:schemeClr val="accent1"/>
+              </a:effectRef>
+              <a:fontRef idx="minor">
+                <a:schemeClr val="tx1"/>
+              </a:fontRef>
+            </p:style>
+          </p:cxnSp>
+        </p:grpSp>
+        <p:grpSp>
+          <p:nvGrpSpPr>
+            <p:cNvPr id="72" name="Group 71">
+              <a:extLst>
+                <a:ext uri="{FF2B5EF4-FFF2-40B4-BE49-F238E27FC236}">
+                  <a16:creationId xmlns:a16="http://schemas.microsoft.com/office/drawing/2014/main" id="{59970A83-7836-8F44-AACC-F913E8AD93E6}"/>
+                </a:ext>
+              </a:extLst>
+            </p:cNvPr>
+            <p:cNvGrpSpPr/>
+            <p:nvPr/>
+          </p:nvGrpSpPr>
+          <p:grpSpPr>
+            <a:xfrm rot="3236689">
+              <a:off x="2491408" y="2461144"/>
+              <a:ext cx="138206" cy="2249004"/>
+              <a:chOff x="1621753" y="966083"/>
+              <a:chExt cx="138206" cy="2249004"/>
+            </a:xfrm>
+          </p:grpSpPr>
+          <p:cxnSp>
+            <p:nvCxnSpPr>
+              <p:cNvPr id="73" name="Straight Arrow Connector 72">
+                <a:extLst>
+                  <a:ext uri="{FF2B5EF4-FFF2-40B4-BE49-F238E27FC236}">
+                    <a16:creationId xmlns:a16="http://schemas.microsoft.com/office/drawing/2014/main" id="{C65A25F4-626F-3F41-9740-DA61416C7012}"/>
+                  </a:ext>
+                </a:extLst>
+              </p:cNvPr>
+              <p:cNvCxnSpPr>
+                <a:cxnSpLocks/>
+              </p:cNvCxnSpPr>
+              <p:nvPr/>
+            </p:nvCxnSpPr>
+            <p:spPr>
+              <a:xfrm rot="18363311" flipH="1">
+                <a:off x="741634" y="2196762"/>
+                <a:ext cx="2036650" cy="0"/>
+              </a:xfrm>
+              <a:prstGeom prst="straightConnector1">
+                <a:avLst/>
+              </a:prstGeom>
+              <a:ln w="53975">
+                <a:solidFill>
+                  <a:schemeClr val="accent1"/>
+                </a:solidFill>
+                <a:headEnd type="none"/>
+                <a:tailEnd type="triangle"/>
+              </a:ln>
+            </p:spPr>
+            <p:style>
+              <a:lnRef idx="1">
+                <a:schemeClr val="accent1"/>
+              </a:lnRef>
+              <a:fillRef idx="0">
+                <a:schemeClr val="accent1"/>
+              </a:fillRef>
+              <a:effectRef idx="0">
+                <a:schemeClr val="accent1"/>
+              </a:effectRef>
+              <a:fontRef idx="minor">
+                <a:schemeClr val="tx1"/>
+              </a:fontRef>
+            </p:style>
+          </p:cxnSp>
+          <p:cxnSp>
+            <p:nvCxnSpPr>
+              <p:cNvPr id="74" name="Straight Arrow Connector 73">
+                <a:extLst>
+                  <a:ext uri="{FF2B5EF4-FFF2-40B4-BE49-F238E27FC236}">
+                    <a16:creationId xmlns:a16="http://schemas.microsoft.com/office/drawing/2014/main" id="{7213D65A-170C-F24C-98A9-4BF501ECD658}"/>
+                  </a:ext>
+                </a:extLst>
+              </p:cNvPr>
+              <p:cNvCxnSpPr>
+                <a:cxnSpLocks/>
+              </p:cNvCxnSpPr>
+              <p:nvPr/>
+            </p:nvCxnSpPr>
+            <p:spPr>
+              <a:xfrm rot="18363311" flipH="1" flipV="1">
+                <a:off x="616844" y="1970992"/>
+                <a:ext cx="2009820" cy="1"/>
+              </a:xfrm>
+              <a:prstGeom prst="straightConnector1">
+                <a:avLst/>
+              </a:prstGeom>
+              <a:ln w="53975">
+                <a:solidFill>
+                  <a:schemeClr val="accent1"/>
+                </a:solidFill>
+                <a:headEnd type="triangle"/>
+                <a:tailEnd type="none"/>
+              </a:ln>
+            </p:spPr>
+            <p:style>
+              <a:lnRef idx="1">
+                <a:schemeClr val="accent1"/>
+              </a:lnRef>
+              <a:fillRef idx="0">
+                <a:schemeClr val="accent1"/>
+              </a:fillRef>
+              <a:effectRef idx="0">
+                <a:schemeClr val="accent1"/>
+              </a:effectRef>
+              <a:fontRef idx="minor">
+                <a:schemeClr val="tx1"/>
+              </a:fontRef>
+            </p:style>
+          </p:cxnSp>
+        </p:grpSp>
+        <p:sp>
+          <p:nvSpPr>
+            <p:cNvPr id="75" name="TextBox 74">
+              <a:extLst>
+                <a:ext uri="{FF2B5EF4-FFF2-40B4-BE49-F238E27FC236}">
+                  <a16:creationId xmlns:a16="http://schemas.microsoft.com/office/drawing/2014/main" id="{9D489F66-A27A-9F4E-8BCD-3D7C8BDF9B29}"/>
+                </a:ext>
+              </a:extLst>
+            </p:cNvPr>
+            <p:cNvSpPr txBox="1"/>
+            <p:nvPr/>
+          </p:nvSpPr>
+          <p:spPr>
+            <a:xfrm>
+              <a:off x="2331128" y="3673310"/>
+              <a:ext cx="635110" cy="523220"/>
+            </a:xfrm>
+            <a:prstGeom prst="rect">
+              <a:avLst/>
+            </a:prstGeom>
+            <a:noFill/>
+          </p:spPr>
+          <p:txBody>
+            <a:bodyPr wrap="none" rtlCol="0">
+              <a:spAutoFit/>
+            </a:bodyPr>
+            <a:lstStyle/>
+            <a:p>
+              <a:r>
+                <a:rPr lang="en-US" sz="2800" dirty="0"/>
+                <a:t>⍺</a:t>
+              </a:r>
+              <a:r>
+                <a:rPr lang="en-US" sz="2800" baseline="-25000" dirty="0"/>
+                <a:t>13</a:t>
+              </a:r>
+              <a:endParaRPr lang="en-US" sz="2800" dirty="0"/>
+            </a:p>
+          </p:txBody>
+        </p:sp>
       </p:grpSp>
-      <p:sp>
-        <p:nvSpPr>
-          <p:cNvPr id="75" name="TextBox 74">
-            <a:extLst>
-              <a:ext uri="{FF2B5EF4-FFF2-40B4-BE49-F238E27FC236}">
-                <a16:creationId xmlns:a16="http://schemas.microsoft.com/office/drawing/2014/main" id="{9D489F66-A27A-9F4E-8BCD-3D7C8BDF9B29}"/>
-              </a:ext>
-            </a:extLst>
-          </p:cNvPr>
-          <p:cNvSpPr txBox="1"/>
-          <p:nvPr/>
-        </p:nvSpPr>
-        <p:spPr>
-          <a:xfrm>
-            <a:off x="2138672" y="3558752"/>
-            <a:ext cx="635110" cy="523220"/>
-          </a:xfrm>
-          <a:prstGeom prst="rect">
-            <a:avLst/>
-          </a:prstGeom>
-          <a:noFill/>
-        </p:spPr>
-        <p:txBody>
-          <a:bodyPr wrap="none" rtlCol="0">
-            <a:spAutoFit/>
-          </a:bodyPr>
-          <a:lstStyle/>
-          <a:p>
-            <a:r>
-              <a:rPr lang="en-US" sz="2800" dirty="0"/>
-              <a:t>⍺</a:t>
-            </a:r>
-            <a:r>
-              <a:rPr lang="en-US" sz="2800" baseline="-25000" dirty="0"/>
-              <a:t>13</a:t>
-            </a:r>
-            <a:endParaRPr lang="en-US" sz="2800" dirty="0"/>
-          </a:p>
-        </p:txBody>
-      </p:sp>
     </p:spTree>
     <p:extLst>
       <p:ext uri="{BB962C8B-B14F-4D97-AF65-F5344CB8AC3E}">

</xml_diff>